<commit_message>
Revideret tidsplan + indsat i pp
</commit_message>
<xml_diff>
--- a/PowerPoint/Systematic Case.pptx
+++ b/PowerPoint/Systematic Case.pptx
@@ -7200,7 +7200,7 @@
         <p:spPr>
           <a:xfrm>
             <a:off x="571472" y="928670"/>
-            <a:ext cx="8031366" cy="830997"/>
+            <a:ext cx="8172430" cy="830997"/>
           </a:xfrm>
           <a:prstGeom prst="rect">
             <a:avLst/>
@@ -7219,11 +7219,19 @@
             </a:r>
             <a:r>
               <a:rPr lang="da-DK" sz="4800" dirty="0" smtClean="0"/>
-              <a:t> case </a:t>
+              <a:t> </a:t>
+            </a:r>
+            <a:r>
+              <a:rPr lang="da-DK" sz="4800" dirty="0" smtClean="0"/>
+              <a:t>Case </a:t>
             </a:r>
             <a:r>
               <a:rPr lang="da-DK" sz="4800" dirty="0" err="1" smtClean="0"/>
-              <a:t>presentation</a:t>
+              <a:t>P</a:t>
+            </a:r>
+            <a:r>
+              <a:rPr lang="da-DK" sz="4800" dirty="0" err="1" smtClean="0"/>
+              <a:t>resentation</a:t>
             </a:r>
             <a:endParaRPr lang="da-DK" sz="4800" dirty="0"/>
           </a:p>
@@ -7267,8 +7275,8 @@
         </p:nvSpPr>
         <p:spPr>
           <a:xfrm>
-            <a:off x="2214546" y="5857892"/>
-            <a:ext cx="4676280" cy="369332"/>
+            <a:off x="2214546" y="5733256"/>
+            <a:ext cx="4676280" cy="646331"/>
           </a:xfrm>
           <a:prstGeom prst="rect">
             <a:avLst/>
@@ -7283,7 +7291,17 @@
           <a:p>
             <a:r>
               <a:rPr lang="da-DK" dirty="0" smtClean="0"/>
-              <a:t>Anders, Christian, David, Michael and Peter</a:t>
+              <a:t>Anders, Christian, David, Michael and </a:t>
+            </a:r>
+            <a:r>
+              <a:rPr lang="da-DK" dirty="0" smtClean="0"/>
+              <a:t>Peter</a:t>
+            </a:r>
+          </a:p>
+          <a:p>
+            <a:r>
+              <a:rPr lang="da-DK" dirty="0" smtClean="0"/>
+              <a:t>15/10 2010</a:t>
             </a:r>
             <a:endParaRPr lang="da-DK" dirty="0"/>
           </a:p>
@@ -7672,13 +7690,7 @@
               <a:rPr lang="da-DK" dirty="0" smtClean="0">
                 <a:sym typeface="Wingdings" pitchFamily="2" charset="2"/>
               </a:rPr>
-              <a:t> </a:t>
-            </a:r>
-            <a:r>
-              <a:rPr lang="da-DK" dirty="0" smtClean="0">
-                <a:sym typeface="Wingdings" pitchFamily="2" charset="2"/>
-              </a:rPr>
-              <a:t>of </a:t>
+              <a:t> of </a:t>
             </a:r>
             <a:r>
               <a:rPr lang="da-DK" dirty="0" err="1" smtClean="0">
@@ -7765,14 +7777,14 @@
       </p:sp>
       <p:pic>
         <p:nvPicPr>
-          <p:cNvPr id="4097" name="Picture 1" descr="D:\Dokumenter\AU\3. Semester\System engineering\Case work\tisyee2010\documents\Project plan\Schedule.png"/>
+          <p:cNvPr id="11265" name="Picture 1" descr="C:\Users\Christian\Documents\Teknisk IT\TI3\Systems Engineering\Company E SVN\documents\Project plan\Schedule.png"/>
           <p:cNvPicPr>
             <a:picLocks noChangeAspect="1" noChangeArrowheads="1"/>
           </p:cNvPicPr>
           <p:nvPr/>
         </p:nvPicPr>
         <p:blipFill>
-          <a:blip r:embed="rId3"/>
+          <a:blip r:embed="rId3" cstate="print"/>
           <a:srcRect/>
           <a:stretch>
             <a:fillRect/>
@@ -7780,8 +7792,8 @@
         </p:blipFill>
         <p:spPr bwMode="auto">
           <a:xfrm>
-            <a:off x="214282" y="1785926"/>
-            <a:ext cx="8715436" cy="3960818"/>
+            <a:off x="204299" y="1772816"/>
+            <a:ext cx="8735403" cy="4005461"/>
           </a:xfrm>
           <a:prstGeom prst="rect">
             <a:avLst/>
@@ -7857,7 +7869,7 @@
           <p:nvPr/>
         </p:nvPicPr>
         <p:blipFill>
-          <a:blip r:embed="rId3"/>
+          <a:blip r:embed="rId3" cstate="print"/>
           <a:srcRect/>
           <a:stretch>
             <a:fillRect/>
@@ -8027,7 +8039,7 @@
           <a:blip r:embed="rId3" cstate="print">
             <a:extLst>
               <a:ext uri="{28A0092B-C50C-407E-A947-70E740481C1C}">
-                <a14:useLocalDpi xmlns:ve="http://schemas.openxmlformats.org/markup-compatibility/2006" xmlns:m="http://schemas.openxmlformats.org/officeDocument/2006/math" xmlns:wp="http://schemas.openxmlformats.org/drawingml/2006/wordprocessingDrawing" xmlns:wne="http://schemas.microsoft.com/office/word/2006/wordml" xmlns="" xmlns:wpc="http://schemas.microsoft.com/office/word/2010/wordprocessingCanvas" xmlns:mc="http://schemas.openxmlformats.org/markup-compatibility/2006" xmlns:o="urn:schemas-microsoft-com:office:office" xmlns:v="urn:schemas-microsoft-com:vml" xmlns:wp14="http://schemas.microsoft.com/office/word/2010/wordprocessingDrawing" xmlns:w10="urn:schemas-microsoft-com:office:word" xmlns:w="http://schemas.openxmlformats.org/wordprocessingml/2006/main" xmlns:w14="http://schemas.microsoft.com/office/word/2010/wordml" xmlns:wpg="http://schemas.microsoft.com/office/word/2010/wordprocessingGroup" xmlns:wpi="http://schemas.microsoft.com/office/word/2010/wordprocessingInk" xmlns:wps="http://schemas.microsoft.com/office/word/2010/wordprocessingShape" xmlns:a14="http://schemas.microsoft.com/office/drawing/2010/main" xmlns:pic="http://schemas.openxmlformats.org/drawingml/2006/picture" xmlns:lc="http://schemas.openxmlformats.org/drawingml/2006/lockedCanvas" val="0"/>
+                <a14:useLocalDpi xmlns:lc="http://schemas.openxmlformats.org/drawingml/2006/lockedCanvas" xmlns:pic="http://schemas.openxmlformats.org/drawingml/2006/picture" xmlns:a14="http://schemas.microsoft.com/office/drawing/2010/main" xmlns:wps="http://schemas.microsoft.com/office/word/2010/wordprocessingShape" xmlns:wpi="http://schemas.microsoft.com/office/word/2010/wordprocessingInk" xmlns:wpg="http://schemas.microsoft.com/office/word/2010/wordprocessingGroup" xmlns:w14="http://schemas.microsoft.com/office/word/2010/wordml" xmlns:w="http://schemas.openxmlformats.org/wordprocessingml/2006/main" xmlns:w10="urn:schemas-microsoft-com:office:word" xmlns:wp14="http://schemas.microsoft.com/office/word/2010/wordprocessingDrawing" xmlns:v="urn:schemas-microsoft-com:vml" xmlns:o="urn:schemas-microsoft-com:office:office" xmlns:mc="http://schemas.openxmlformats.org/markup-compatibility/2006" xmlns:wpc="http://schemas.microsoft.com/office/word/2010/wordprocessingCanvas" xmlns="" xmlns:wne="http://schemas.microsoft.com/office/word/2006/wordml" xmlns:wp="http://schemas.openxmlformats.org/drawingml/2006/wordprocessingDrawing" xmlns:m="http://schemas.openxmlformats.org/officeDocument/2006/math" xmlns:ve="http://schemas.openxmlformats.org/markup-compatibility/2006" val="0"/>
               </a:ext>
             </a:extLst>
           </a:blip>
@@ -8291,7 +8303,7 @@
           <p:nvPr/>
         </p:nvPicPr>
         <p:blipFill>
-          <a:blip r:embed="rId3"/>
+          <a:blip r:embed="rId3" cstate="print"/>
           <a:srcRect/>
           <a:stretch>
             <a:fillRect/>
@@ -8356,20 +8368,12 @@
           <a:lstStyle/>
           <a:p>
             <a:r>
+              <a:rPr lang="da-DK" dirty="0" smtClean="0"/>
+              <a:t>Future </a:t>
+            </a:r>
+            <a:r>
               <a:rPr lang="da-DK" dirty="0" err="1" smtClean="0"/>
-              <a:t>What</a:t>
-            </a:r>
-            <a:r>
-              <a:rPr lang="da-DK" dirty="0" smtClean="0"/>
-              <a:t> to do </a:t>
-            </a:r>
-            <a:r>
-              <a:rPr lang="da-DK" dirty="0" err="1" smtClean="0"/>
-              <a:t>next</a:t>
-            </a:r>
-            <a:r>
-              <a:rPr lang="da-DK" dirty="0" smtClean="0"/>
-              <a:t>?</a:t>
+              <a:t>work</a:t>
             </a:r>
             <a:endParaRPr lang="da-DK" dirty="0"/>
           </a:p>

</xml_diff>

<commit_message>
Comments added to dismounted COP
</commit_message>
<xml_diff>
--- a/PowerPoint/Systematic Case.pptx
+++ b/PowerPoint/Systematic Case.pptx
@@ -363,13 +363,18 @@
             <a:fld id="{3D459B46-1149-4E67-8273-C98C2D17F7D3}" type="slidenum">
               <a:rPr lang="da-DK" smtClean="0"/>
               <a:pPr/>
-              <a:t>‹nr.›</a:t>
+              <a:t>‹#›</a:t>
             </a:fld>
             <a:endParaRPr lang="da-DK"/>
           </a:p>
         </p:txBody>
       </p:sp>
     </p:spTree>
+    <p:extLst>
+      <p:ext uri="{BB962C8B-B14F-4D97-AF65-F5344CB8AC3E}">
+        <p14:creationId xmlns:p14="http://schemas.microsoft.com/office/powerpoint/2010/main" val="543323538"/>
+      </p:ext>
+    </p:extLst>
   </p:cSld>
   <p:clrMap bg1="lt1" tx1="dk1" bg2="lt2" tx2="dk2" accent1="accent1" accent2="accent2" accent3="accent3" accent4="accent4" accent5="accent5" accent6="accent6" hlink="hlink" folHlink="folHlink"/>
   <p:notesStyle>
@@ -1031,7 +1036,138 @@
           <a:p>
             <a:r>
               <a:rPr lang="da-DK" dirty="0" smtClean="0"/>
-              <a:t>Peter</a:t>
+              <a:t>1Kg max</a:t>
+            </a:r>
+          </a:p>
+          <a:p>
+            <a:r>
+              <a:rPr lang="da-DK" dirty="0" err="1" smtClean="0"/>
+              <a:t>direct</a:t>
+            </a:r>
+            <a:r>
+              <a:rPr lang="da-DK" dirty="0" smtClean="0"/>
+              <a:t> </a:t>
+            </a:r>
+            <a:r>
+              <a:rPr lang="da-DK" dirty="0" err="1" smtClean="0"/>
+              <a:t>sunlight</a:t>
+            </a:r>
+            <a:endParaRPr lang="da-DK" dirty="0" smtClean="0"/>
+          </a:p>
+          <a:p>
+            <a:r>
+              <a:rPr lang="da-DK" dirty="0" smtClean="0"/>
+              <a:t>Batteritype </a:t>
+            </a:r>
+            <a:r>
+              <a:rPr lang="da-DK" dirty="0" err="1" smtClean="0"/>
+              <a:t>Cobolt</a:t>
+            </a:r>
+            <a:r>
+              <a:rPr lang="da-DK" dirty="0" smtClean="0"/>
+              <a:t>/</a:t>
+            </a:r>
+            <a:r>
+              <a:rPr lang="da-DK" dirty="0" err="1" smtClean="0"/>
+              <a:t>Phosphate</a:t>
+            </a:r>
+            <a:r>
+              <a:rPr lang="da-DK" dirty="0" smtClean="0"/>
+              <a:t> Li-Ion</a:t>
+            </a:r>
+          </a:p>
+          <a:p>
+            <a:r>
+              <a:rPr lang="da-DK" dirty="0" smtClean="0"/>
+              <a:t>½kg </a:t>
+            </a:r>
+            <a:r>
+              <a:rPr lang="da-DK" dirty="0" err="1" smtClean="0"/>
+              <a:t>battery</a:t>
+            </a:r>
+            <a:r>
+              <a:rPr lang="da-DK" dirty="0" smtClean="0"/>
+              <a:t> =&gt; 3hrs </a:t>
+            </a:r>
+            <a:r>
+              <a:rPr lang="da-DK" dirty="0" err="1" smtClean="0"/>
+              <a:t>direct</a:t>
+            </a:r>
+            <a:r>
+              <a:rPr lang="da-DK" dirty="0" smtClean="0"/>
+              <a:t> </a:t>
+            </a:r>
+            <a:r>
+              <a:rPr lang="da-DK" dirty="0" err="1" smtClean="0"/>
+              <a:t>sunlight</a:t>
+            </a:r>
+            <a:r>
+              <a:rPr lang="da-DK" dirty="0" smtClean="0"/>
+              <a:t> @ 9.7"</a:t>
+            </a:r>
+          </a:p>
+          <a:p>
+            <a:r>
+              <a:rPr lang="da-DK" dirty="0" err="1" smtClean="0"/>
+              <a:t>glove</a:t>
+            </a:r>
+            <a:r>
+              <a:rPr lang="da-DK" dirty="0" smtClean="0"/>
+              <a:t> / </a:t>
+            </a:r>
+            <a:r>
+              <a:rPr lang="da-DK" dirty="0" err="1" smtClean="0"/>
+              <a:t>Adm</a:t>
+            </a:r>
+            <a:r>
+              <a:rPr lang="da-DK" dirty="0" smtClean="0"/>
+              <a:t> Mode </a:t>
+            </a:r>
+          </a:p>
+          <a:p>
+            <a:r>
+              <a:rPr lang="da-DK" dirty="0" err="1" smtClean="0"/>
+              <a:t>IPad</a:t>
+            </a:r>
+            <a:r>
+              <a:rPr lang="da-DK" dirty="0" smtClean="0"/>
+              <a:t> </a:t>
+            </a:r>
+            <a:r>
+              <a:rPr lang="da-DK" dirty="0" err="1" smtClean="0"/>
+              <a:t>Like</a:t>
+            </a:r>
+            <a:endParaRPr lang="da-DK" dirty="0" smtClean="0"/>
+          </a:p>
+          <a:p>
+            <a:r>
+              <a:rPr lang="da-DK" dirty="0" err="1" smtClean="0"/>
+              <a:t>Shock</a:t>
+            </a:r>
+            <a:r>
+              <a:rPr lang="da-DK" dirty="0" smtClean="0"/>
+              <a:t> </a:t>
+            </a:r>
+            <a:r>
+              <a:rPr lang="da-DK" dirty="0" err="1" smtClean="0"/>
+              <a:t>Resistant</a:t>
+            </a:r>
+            <a:endParaRPr lang="da-DK" dirty="0" smtClean="0"/>
+          </a:p>
+          <a:p>
+            <a:r>
+              <a:rPr lang="da-DK" dirty="0" err="1" smtClean="0"/>
+              <a:t>Communication</a:t>
+            </a:r>
+            <a:r>
+              <a:rPr lang="da-DK" dirty="0" smtClean="0"/>
+              <a:t> via GSM/SAT/WLAN</a:t>
+            </a:r>
+          </a:p>
+          <a:p>
+            <a:r>
+              <a:rPr lang="da-DK" dirty="0" smtClean="0"/>
+              <a:t>Audio Conference Call</a:t>
             </a:r>
             <a:endParaRPr lang="da-DK" dirty="0"/>
           </a:p>
@@ -1752,7 +1888,7 @@
             <a:fld id="{F8DE68CA-CE29-48B2-A76D-5FAA5388020D}" type="slidenum">
               <a:rPr lang="da-DK" smtClean="0"/>
               <a:pPr/>
-              <a:t>‹nr.›</a:t>
+              <a:t>‹#›</a:t>
             </a:fld>
             <a:endParaRPr lang="da-DK"/>
           </a:p>
@@ -1960,7 +2096,7 @@
             <a:fld id="{F8DE68CA-CE29-48B2-A76D-5FAA5388020D}" type="slidenum">
               <a:rPr lang="da-DK" smtClean="0"/>
               <a:pPr/>
-              <a:t>‹nr.›</a:t>
+              <a:t>‹#›</a:t>
             </a:fld>
             <a:endParaRPr lang="da-DK"/>
           </a:p>
@@ -2371,7 +2507,7 @@
             <a:fld id="{F8DE68CA-CE29-48B2-A76D-5FAA5388020D}" type="slidenum">
               <a:rPr lang="da-DK" smtClean="0"/>
               <a:pPr/>
-              <a:t>‹nr.›</a:t>
+              <a:t>‹#›</a:t>
             </a:fld>
             <a:endParaRPr lang="da-DK"/>
           </a:p>
@@ -2634,7 +2770,7 @@
             <a:fld id="{F8DE68CA-CE29-48B2-A76D-5FAA5388020D}" type="slidenum">
               <a:rPr lang="da-DK" smtClean="0"/>
               <a:pPr/>
-              <a:t>‹nr.›</a:t>
+              <a:t>‹#›</a:t>
             </a:fld>
             <a:endParaRPr lang="da-DK"/>
           </a:p>
@@ -3304,7 +3440,7 @@
             <a:fld id="{F8DE68CA-CE29-48B2-A76D-5FAA5388020D}" type="slidenum">
               <a:rPr lang="da-DK" smtClean="0"/>
               <a:pPr/>
-              <a:t>‹nr.›</a:t>
+              <a:t>‹#›</a:t>
             </a:fld>
             <a:endParaRPr lang="da-DK"/>
           </a:p>
@@ -3471,7 +3607,7 @@
             <a:fld id="{F8DE68CA-CE29-48B2-A76D-5FAA5388020D}" type="slidenum">
               <a:rPr lang="da-DK" smtClean="0"/>
               <a:pPr/>
-              <a:t>‹nr.›</a:t>
+              <a:t>‹#›</a:t>
             </a:fld>
             <a:endParaRPr lang="da-DK"/>
           </a:p>
@@ -4432,7 +4568,7 @@
             <a:fld id="{F8DE68CA-CE29-48B2-A76D-5FAA5388020D}" type="slidenum">
               <a:rPr lang="da-DK" smtClean="0"/>
               <a:pPr/>
-              <a:t>‹nr.›</a:t>
+              <a:t>‹#›</a:t>
             </a:fld>
             <a:endParaRPr lang="da-DK"/>
           </a:p>
@@ -4575,7 +4711,7 @@
             <a:fld id="{F8DE68CA-CE29-48B2-A76D-5FAA5388020D}" type="slidenum">
               <a:rPr lang="da-DK" smtClean="0"/>
               <a:pPr/>
-              <a:t>‹nr.›</a:t>
+              <a:t>‹#›</a:t>
             </a:fld>
             <a:endParaRPr lang="da-DK"/>
           </a:p>
@@ -4898,7 +5034,7 @@
             <a:fld id="{F8DE68CA-CE29-48B2-A76D-5FAA5388020D}" type="slidenum">
               <a:rPr lang="da-DK" smtClean="0"/>
               <a:pPr/>
-              <a:t>‹nr.›</a:t>
+              <a:t>‹#›</a:t>
             </a:fld>
             <a:endParaRPr lang="da-DK"/>
           </a:p>
@@ -5517,7 +5653,7 @@
             <a:fld id="{F8DE68CA-CE29-48B2-A76D-5FAA5388020D}" type="slidenum">
               <a:rPr lang="da-DK" smtClean="0"/>
               <a:pPr/>
-              <a:t>‹nr.›</a:t>
+              <a:t>‹#›</a:t>
             </a:fld>
             <a:endParaRPr lang="da-DK"/>
           </a:p>
@@ -6053,7 +6189,7 @@
             <a:fld id="{F8DE68CA-CE29-48B2-A76D-5FAA5388020D}" type="slidenum">
               <a:rPr lang="da-DK" smtClean="0"/>
               <a:pPr/>
-              <a:t>‹nr.›</a:t>
+              <a:t>‹#›</a:t>
             </a:fld>
             <a:endParaRPr lang="da-DK"/>
           </a:p>
@@ -6768,7 +6904,7 @@
             <a:fld id="{F8DE68CA-CE29-48B2-A76D-5FAA5388020D}" type="slidenum">
               <a:rPr lang="da-DK" smtClean="0"/>
               <a:pPr/>
-              <a:t>‹nr.›</a:t>
+              <a:t>‹#›</a:t>
             </a:fld>
             <a:endParaRPr lang="da-DK"/>
           </a:p>
@@ -7219,19 +7355,11 @@
             </a:r>
             <a:r>
               <a:rPr lang="da-DK" sz="4800" dirty="0" smtClean="0"/>
-              <a:t> </a:t>
-            </a:r>
-            <a:r>
-              <a:rPr lang="da-DK" sz="4800" dirty="0" smtClean="0"/>
-              <a:t>Case </a:t>
+              <a:t> Case </a:t>
             </a:r>
             <a:r>
               <a:rPr lang="da-DK" sz="4800" dirty="0" err="1" smtClean="0"/>
-              <a:t>P</a:t>
-            </a:r>
-            <a:r>
-              <a:rPr lang="da-DK" sz="4800" dirty="0" err="1" smtClean="0"/>
-              <a:t>resentation</a:t>
+              <a:t>Presentation</a:t>
             </a:r>
             <a:endParaRPr lang="da-DK" sz="4800" dirty="0"/>
           </a:p>
@@ -7291,11 +7419,7 @@
           <a:p>
             <a:r>
               <a:rPr lang="da-DK" dirty="0" smtClean="0"/>
-              <a:t>Anders, Christian, David, Michael and </a:t>
-            </a:r>
-            <a:r>
-              <a:rPr lang="da-DK" dirty="0" smtClean="0"/>
-              <a:t>Peter</a:t>
+              <a:t>Anders, Christian, David, Michael and Peter</a:t>
             </a:r>
           </a:p>
           <a:p>
@@ -7312,6 +7436,13 @@
   <p:clrMapOvr>
     <a:masterClrMapping/>
   </p:clrMapOvr>
+  <p:timing>
+    <p:tnLst>
+      <p:par>
+        <p:cTn id="1" dur="indefinite" restart="never" nodeType="tmRoot"/>
+      </p:par>
+    </p:tnLst>
+  </p:timing>
 </p:sld>
 </file>
 
@@ -7732,6 +7863,13 @@
   <p:clrMapOvr>
     <a:masterClrMapping/>
   </p:clrMapOvr>
+  <p:timing>
+    <p:tnLst>
+      <p:par>
+        <p:cTn id="1" dur="indefinite" restart="never" nodeType="tmRoot"/>
+      </p:par>
+    </p:tnLst>
+  </p:timing>
 </p:sld>
 </file>
 
@@ -8039,7 +8177,7 @@
           <a:blip r:embed="rId3" cstate="print">
             <a:extLst>
               <a:ext uri="{28A0092B-C50C-407E-A947-70E740481C1C}">
-                <a14:useLocalDpi xmlns:lc="http://schemas.openxmlformats.org/drawingml/2006/lockedCanvas" xmlns:pic="http://schemas.openxmlformats.org/drawingml/2006/picture" xmlns:a14="http://schemas.microsoft.com/office/drawing/2010/main" xmlns:wps="http://schemas.microsoft.com/office/word/2010/wordprocessingShape" xmlns:wpi="http://schemas.microsoft.com/office/word/2010/wordprocessingInk" xmlns:wpg="http://schemas.microsoft.com/office/word/2010/wordprocessingGroup" xmlns:w14="http://schemas.microsoft.com/office/word/2010/wordml" xmlns:w="http://schemas.openxmlformats.org/wordprocessingml/2006/main" xmlns:w10="urn:schemas-microsoft-com:office:word" xmlns:wp14="http://schemas.microsoft.com/office/word/2010/wordprocessingDrawing" xmlns:v="urn:schemas-microsoft-com:vml" xmlns:o="urn:schemas-microsoft-com:office:office" xmlns:mc="http://schemas.openxmlformats.org/markup-compatibility/2006" xmlns:wpc="http://schemas.microsoft.com/office/word/2010/wordprocessingCanvas" xmlns="" xmlns:wne="http://schemas.microsoft.com/office/word/2006/wordml" xmlns:wp="http://schemas.openxmlformats.org/drawingml/2006/wordprocessingDrawing" xmlns:m="http://schemas.openxmlformats.org/officeDocument/2006/math" xmlns:ve="http://schemas.openxmlformats.org/markup-compatibility/2006" val="0"/>
+                <a14:useLocalDpi xmlns:a14="http://schemas.microsoft.com/office/drawing/2010/main" val="0"/>
               </a:ext>
             </a:extLst>
           </a:blip>
@@ -8063,6 +8201,13 @@
   <p:clrMapOvr>
     <a:masterClrMapping/>
   </p:clrMapOvr>
+  <p:timing>
+    <p:tnLst>
+      <p:par>
+        <p:cTn id="1" dur="indefinite" restart="never" nodeType="tmRoot"/>
+      </p:par>
+    </p:tnLst>
+  </p:timing>
 </p:sld>
 </file>
 
@@ -8141,6 +8286,13 @@
   <p:clrMapOvr>
     <a:masterClrMapping/>
   </p:clrMapOvr>
+  <p:timing>
+    <p:tnLst>
+      <p:par>
+        <p:cTn id="1" dur="indefinite" restart="never" nodeType="tmRoot"/>
+      </p:par>
+    </p:tnLst>
+  </p:timing>
 </p:sld>
 </file>
 
@@ -8240,9 +8392,59 @@
         </p:xfrm>
         <a:graphic>
           <a:graphicData uri="http://schemas.openxmlformats.org/presentationml/2006/ole">
-            <p:oleObj spid="_x0000_s3073" name="Visio" r:id="rId4" imgW="5698846" imgH="4468673" progId="Visio.Drawing.11">
-              <p:embed/>
-            </p:oleObj>
+            <mc:AlternateContent xmlns:mc="http://schemas.openxmlformats.org/markup-compatibility/2006">
+              <mc:Choice xmlns:v="urn:schemas-microsoft-com:vml" Requires="v">
+                <p:oleObj spid="_x0000_s3074" name="Visio" r:id="rId4" imgW="5698846" imgH="4468673" progId="Visio.Drawing.11">
+                  <p:embed/>
+                </p:oleObj>
+              </mc:Choice>
+              <mc:Fallback>
+                <p:oleObj name="Visio" r:id="rId4" imgW="5698846" imgH="4468673" progId="Visio.Drawing.11">
+                  <p:embed/>
+                  <p:pic>
+                    <p:nvPicPr>
+                      <p:cNvPr id="0" name="Picture 1"/>
+                      <p:cNvPicPr>
+                        <a:picLocks noChangeAspect="1" noChangeArrowheads="1"/>
+                      </p:cNvPicPr>
+                      <p:nvPr/>
+                    </p:nvPicPr>
+                    <p:blipFill>
+                      <a:blip r:embed="rId5">
+                        <a:extLst>
+                          <a:ext uri="{28A0092B-C50C-407E-A947-70E740481C1C}">
+                            <a14:useLocalDpi xmlns:a14="http://schemas.microsoft.com/office/drawing/2010/main" val="0"/>
+                          </a:ext>
+                        </a:extLst>
+                      </a:blip>
+                      <a:srcRect/>
+                      <a:stretch>
+                        <a:fillRect/>
+                      </a:stretch>
+                    </p:blipFill>
+                    <p:spPr bwMode="auto">
+                      <a:xfrm>
+                        <a:off x="1449900" y="1500174"/>
+                        <a:ext cx="6193934" cy="4857784"/>
+                      </a:xfrm>
+                      <a:prstGeom prst="rect">
+                        <a:avLst/>
+                      </a:prstGeom>
+                      <a:noFill/>
+                      <a:extLst>
+                        <a:ext uri="{909E8E84-426E-40DD-AFC4-6F175D3DCCD1}">
+                          <a14:hiddenFill xmlns:a14="http://schemas.microsoft.com/office/drawing/2010/main">
+                            <a:solidFill>
+                              <a:srgbClr val="FFFFFF"/>
+                            </a:solidFill>
+                          </a14:hiddenFill>
+                        </a:ext>
+                      </a:extLst>
+                    </p:spPr>
+                  </p:pic>
+                </p:oleObj>
+              </mc:Fallback>
+            </mc:AlternateContent>
           </a:graphicData>
         </a:graphic>
       </p:graphicFrame>
@@ -8251,6 +8453,13 @@
   <p:clrMapOvr>
     <a:masterClrMapping/>
   </p:clrMapOvr>
+  <p:timing>
+    <p:tnLst>
+      <p:par>
+        <p:cTn id="1" dur="indefinite" restart="never" nodeType="tmRoot"/>
+      </p:par>
+    </p:tnLst>
+  </p:timing>
 </p:sld>
 </file>
 
@@ -8332,6 +8541,13 @@
   <p:clrMapOvr>
     <a:masterClrMapping/>
   </p:clrMapOvr>
+  <p:timing>
+    <p:tnLst>
+      <p:par>
+        <p:cTn id="1" dur="indefinite" restart="never" nodeType="tmRoot"/>
+      </p:par>
+    </p:tnLst>
+  </p:timing>
 </p:sld>
 </file>
 
@@ -8629,6 +8845,13 @@
   <p:clrMapOvr>
     <a:masterClrMapping/>
   </p:clrMapOvr>
+  <p:timing>
+    <p:tnLst>
+      <p:par>
+        <p:cTn id="1" dur="indefinite" restart="never" nodeType="tmRoot"/>
+      </p:par>
+    </p:tnLst>
+  </p:timing>
 </p:sld>
 </file>
 

</xml_diff>